<commit_message>
presentation: add per year to legal aid stats
</commit_message>
<xml_diff>
--- a/Jargone.pptx
+++ b/Jargone.pptx
@@ -1431,9 +1431,6 @@
             </a:r>
           </a:p>
           <a:p>
-            <a:endParaRPr lang="en-GB" dirty="0"/>
-          </a:p>
-          <a:p>
             <a:r>
               <a:rPr lang="en-GB" dirty="0"/>
               <a:t>Legal aid facts, government legal targets</a:t>
@@ -1655,10 +1652,12 @@
           <a:p>
             <a:r>
               <a:rPr lang="en-GB" dirty="0"/>
-              <a:t>Live editing like google docs, with simple version control like git.</a:t>
-            </a:r>
-          </a:p>
-          <a:p>
+              <a:t>Live editing like google docs, with simple version control </a:t>
+            </a:r>
+            <a:r>
+              <a:rPr lang="en-GB"/>
+              <a:t>like git</a:t>
+            </a:r>
             <a:endParaRPr lang="en-GB" dirty="0"/>
           </a:p>
           <a:p>
@@ -6528,23 +6527,7 @@
                     <a:schemeClr val="tx1"/>
                   </a:solidFill>
                 </a:rPr>
-                <a:t>Up to a million people without access to early </a:t>
-              </a:r>
-              <a:r>
-                <a:rPr lang="en-GB" sz="1750">
-                  <a:solidFill>
-                    <a:schemeClr val="tx1"/>
-                  </a:solidFill>
-                </a:rPr>
-                <a:t>legal advice </a:t>
-              </a:r>
-              <a:r>
-                <a:rPr lang="en-GB" sz="1750" dirty="0">
-                  <a:solidFill>
-                    <a:schemeClr val="tx1"/>
-                  </a:solidFill>
-                </a:rPr>
-                <a:t>and trebled self-representation at court*.</a:t>
+                <a:t>Up to a million people per year without access to early legal advice and trebled self-representation at court*.</a:t>
               </a:r>
             </a:p>
           </p:txBody>
@@ -6742,7 +6725,7 @@
         <p:spPr>
           <a:xfrm>
             <a:off x="2382831" y="6596390"/>
-            <a:ext cx="1538429" cy="261610"/>
+            <a:ext cx="1805082" cy="253916"/>
           </a:xfrm>
           <a:prstGeom prst="rect">
             <a:avLst/>
@@ -6756,9 +6739,22 @@
           <a:lstStyle/>
           <a:p>
             <a:r>
-              <a:rPr lang="en-GB" sz="1050" dirty="0"/>
-              <a:t>*The Law Society 2023</a:t>
-            </a:r>
+              <a:rPr lang="en-GB" sz="1050"/>
+              <a:t>* </a:t>
+            </a:r>
+            <a:r>
+              <a:rPr lang="en-GB" sz="1050">
+                <a:hlinkClick r:id="rId18"/>
+              </a:rPr>
+              <a:t>The </a:t>
+            </a:r>
+            <a:r>
+              <a:rPr lang="en-GB" sz="1050" dirty="0">
+                <a:hlinkClick r:id="rId18"/>
+              </a:rPr>
+              <a:t>Law Society (2023)</a:t>
+            </a:r>
+            <a:endParaRPr lang="en-GB" sz="1050" dirty="0"/>
           </a:p>
         </p:txBody>
       </p:sp>

</xml_diff>